<commit_message>
Last Update 12-06-2019 10:04:34.31
</commit_message>
<xml_diff>
--- a/Slides/Unit 1/CS8392-U1-0-Why we need to study.pptx
+++ b/Slides/Unit 1/CS8392-U1-0-Why we need to study.pptx
@@ -709,6 +709,7 @@
   <p:clrMapOvr>
     <a:masterClrMapping/>
   </p:clrMapOvr>
+  <p:transition/>
 </p:sldLayout>
 </file>
 
@@ -876,6 +877,7 @@
   <p:clrMapOvr>
     <a:masterClrMapping/>
   </p:clrMapOvr>
+  <p:transition/>
 </p:sldLayout>
 </file>
 
@@ -1053,6 +1055,7 @@
   <p:clrMapOvr>
     <a:masterClrMapping/>
   </p:clrMapOvr>
+  <p:transition/>
 </p:sldLayout>
 </file>
 
@@ -1252,6 +1255,7 @@
   <p:clrMapOvr>
     <a:masterClrMapping/>
   </p:clrMapOvr>
+  <p:transition/>
 </p:sldLayout>
 </file>
 
@@ -1495,6 +1499,7 @@
   <p:clrMapOvr>
     <a:masterClrMapping/>
   </p:clrMapOvr>
+  <p:transition/>
 </p:sldLayout>
 </file>
 
@@ -1780,6 +1785,7 @@
   <p:clrMapOvr>
     <a:masterClrMapping/>
   </p:clrMapOvr>
+  <p:transition/>
 </p:sldLayout>
 </file>
 
@@ -2199,6 +2205,7 @@
   <p:clrMapOvr>
     <a:masterClrMapping/>
   </p:clrMapOvr>
+  <p:transition/>
 </p:sldLayout>
 </file>
 
@@ -2314,6 +2321,7 @@
   <p:clrMapOvr>
     <a:masterClrMapping/>
   </p:clrMapOvr>
+  <p:transition/>
 </p:sldLayout>
 </file>
 
@@ -2406,6 +2414,7 @@
   <p:clrMapOvr>
     <a:masterClrMapping/>
   </p:clrMapOvr>
+  <p:transition/>
 </p:sldLayout>
 </file>
 
@@ -2680,6 +2689,7 @@
   <p:clrMapOvr>
     <a:masterClrMapping/>
   </p:clrMapOvr>
+  <p:transition/>
 </p:sldLayout>
 </file>
 
@@ -2930,6 +2940,7 @@
   <p:clrMapOvr>
     <a:masterClrMapping/>
   </p:clrMapOvr>
+  <p:transition/>
 </p:sldLayout>
 </file>
 
@@ -3193,6 +3204,471 @@
     <p:sldLayoutId id="2147483658" r:id="rId10"/>
     <p:sldLayoutId id="2147483659" r:id="rId11"/>
   </p:sldLayoutIdLst>
+  <p:transition/>
+  <p:timing>
+    <p:tnLst>
+      <p:par>
+        <p:cTn id="1" dur="indefinite" restart="never" nodeType="tmRoot">
+          <p:childTnLst>
+            <p:seq concurrent="1" nextAc="seek">
+              <p:cTn id="2" dur="indefinite" nodeType="mainSeq">
+                <p:childTnLst>
+                  <p:par>
+                    <p:cTn id="3" fill="hold">
+                      <p:stCondLst>
+                        <p:cond delay="indefinite"/>
+                      </p:stCondLst>
+                      <p:childTnLst>
+                        <p:par>
+                          <p:cTn id="4" fill="hold">
+                            <p:stCondLst>
+                              <p:cond delay="0"/>
+                            </p:stCondLst>
+                            <p:childTnLst>
+                              <p:par>
+                                <p:cTn id="5" presetID="10" presetClass="entr" presetSubtype="0" fill="hold" grpId="0" nodeType="clickEffect">
+                                  <p:stCondLst>
+                                    <p:cond delay="0"/>
+                                  </p:stCondLst>
+                                  <p:childTnLst>
+                                    <p:set>
+                                      <p:cBhvr>
+                                        <p:cTn id="6" dur="1" fill="hold">
+                                          <p:stCondLst>
+                                            <p:cond delay="0"/>
+                                          </p:stCondLst>
+                                        </p:cTn>
+                                        <p:tgtEl>
+                                          <p:spTgt spid="3">
+                                            <p:txEl>
+                                              <p:pRg st="0" end="0"/>
+                                            </p:txEl>
+                                          </p:spTgt>
+                                        </p:tgtEl>
+                                        <p:attrNameLst>
+                                          <p:attrName>style.visibility</p:attrName>
+                                        </p:attrNameLst>
+                                      </p:cBhvr>
+                                      <p:to>
+                                        <p:strVal val="visible"/>
+                                      </p:to>
+                                    </p:set>
+                                    <p:animEffect transition="in" filter="fade">
+                                      <p:cBhvr>
+                                        <p:cTn id="7" dur="2000"/>
+                                        <p:tgtEl>
+                                          <p:spTgt spid="3">
+                                            <p:txEl>
+                                              <p:pRg st="0" end="0"/>
+                                            </p:txEl>
+                                          </p:spTgt>
+                                        </p:tgtEl>
+                                      </p:cBhvr>
+                                    </p:animEffect>
+                                  </p:childTnLst>
+                                </p:cTn>
+                              </p:par>
+                              <p:par>
+                                <p:cTn id="8" presetID="10" presetClass="entr" presetSubtype="0" fill="hold" grpId="0" nodeType="withEffect">
+                                  <p:stCondLst>
+                                    <p:cond delay="0"/>
+                                  </p:stCondLst>
+                                  <p:childTnLst>
+                                    <p:set>
+                                      <p:cBhvr>
+                                        <p:cTn id="9" dur="1" fill="hold">
+                                          <p:stCondLst>
+                                            <p:cond delay="0"/>
+                                          </p:stCondLst>
+                                        </p:cTn>
+                                        <p:tgtEl>
+                                          <p:spTgt spid="3">
+                                            <p:txEl>
+                                              <p:pRg st="1" end="1"/>
+                                            </p:txEl>
+                                          </p:spTgt>
+                                        </p:tgtEl>
+                                        <p:attrNameLst>
+                                          <p:attrName>style.visibility</p:attrName>
+                                        </p:attrNameLst>
+                                      </p:cBhvr>
+                                      <p:to>
+                                        <p:strVal val="visible"/>
+                                      </p:to>
+                                    </p:set>
+                                    <p:animEffect transition="in" filter="fade">
+                                      <p:cBhvr>
+                                        <p:cTn id="10" dur="2000"/>
+                                        <p:tgtEl>
+                                          <p:spTgt spid="3">
+                                            <p:txEl>
+                                              <p:pRg st="1" end="1"/>
+                                            </p:txEl>
+                                          </p:spTgt>
+                                        </p:tgtEl>
+                                      </p:cBhvr>
+                                    </p:animEffect>
+                                  </p:childTnLst>
+                                </p:cTn>
+                              </p:par>
+                              <p:par>
+                                <p:cTn id="11" presetID="10" presetClass="entr" presetSubtype="0" fill="hold" grpId="0" nodeType="withEffect">
+                                  <p:stCondLst>
+                                    <p:cond delay="0"/>
+                                  </p:stCondLst>
+                                  <p:childTnLst>
+                                    <p:set>
+                                      <p:cBhvr>
+                                        <p:cTn id="12" dur="1" fill="hold">
+                                          <p:stCondLst>
+                                            <p:cond delay="0"/>
+                                          </p:stCondLst>
+                                        </p:cTn>
+                                        <p:tgtEl>
+                                          <p:spTgt spid="3">
+                                            <p:txEl>
+                                              <p:pRg st="2" end="2"/>
+                                            </p:txEl>
+                                          </p:spTgt>
+                                        </p:tgtEl>
+                                        <p:attrNameLst>
+                                          <p:attrName>style.visibility</p:attrName>
+                                        </p:attrNameLst>
+                                      </p:cBhvr>
+                                      <p:to>
+                                        <p:strVal val="visible"/>
+                                      </p:to>
+                                    </p:set>
+                                    <p:animEffect transition="in" filter="fade">
+                                      <p:cBhvr>
+                                        <p:cTn id="13" dur="2000"/>
+                                        <p:tgtEl>
+                                          <p:spTgt spid="3">
+                                            <p:txEl>
+                                              <p:pRg st="2" end="2"/>
+                                            </p:txEl>
+                                          </p:spTgt>
+                                        </p:tgtEl>
+                                      </p:cBhvr>
+                                    </p:animEffect>
+                                  </p:childTnLst>
+                                </p:cTn>
+                              </p:par>
+                              <p:par>
+                                <p:cTn id="14" presetID="10" presetClass="entr" presetSubtype="0" fill="hold" grpId="0" nodeType="withEffect">
+                                  <p:stCondLst>
+                                    <p:cond delay="0"/>
+                                  </p:stCondLst>
+                                  <p:childTnLst>
+                                    <p:set>
+                                      <p:cBhvr>
+                                        <p:cTn id="15" dur="1" fill="hold">
+                                          <p:stCondLst>
+                                            <p:cond delay="0"/>
+                                          </p:stCondLst>
+                                        </p:cTn>
+                                        <p:tgtEl>
+                                          <p:spTgt spid="3">
+                                            <p:txEl>
+                                              <p:pRg st="3" end="3"/>
+                                            </p:txEl>
+                                          </p:spTgt>
+                                        </p:tgtEl>
+                                        <p:attrNameLst>
+                                          <p:attrName>style.visibility</p:attrName>
+                                        </p:attrNameLst>
+                                      </p:cBhvr>
+                                      <p:to>
+                                        <p:strVal val="visible"/>
+                                      </p:to>
+                                    </p:set>
+                                    <p:animEffect transition="in" filter="fade">
+                                      <p:cBhvr>
+                                        <p:cTn id="16" dur="2000"/>
+                                        <p:tgtEl>
+                                          <p:spTgt spid="3">
+                                            <p:txEl>
+                                              <p:pRg st="3" end="3"/>
+                                            </p:txEl>
+                                          </p:spTgt>
+                                        </p:tgtEl>
+                                      </p:cBhvr>
+                                    </p:animEffect>
+                                  </p:childTnLst>
+                                </p:cTn>
+                              </p:par>
+                              <p:par>
+                                <p:cTn id="17" presetID="10" presetClass="entr" presetSubtype="0" fill="hold" grpId="0" nodeType="withEffect">
+                                  <p:stCondLst>
+                                    <p:cond delay="0"/>
+                                  </p:stCondLst>
+                                  <p:childTnLst>
+                                    <p:set>
+                                      <p:cBhvr>
+                                        <p:cTn id="18" dur="1" fill="hold">
+                                          <p:stCondLst>
+                                            <p:cond delay="0"/>
+                                          </p:stCondLst>
+                                        </p:cTn>
+                                        <p:tgtEl>
+                                          <p:spTgt spid="3">
+                                            <p:txEl>
+                                              <p:pRg st="4" end="4"/>
+                                            </p:txEl>
+                                          </p:spTgt>
+                                        </p:tgtEl>
+                                        <p:attrNameLst>
+                                          <p:attrName>style.visibility</p:attrName>
+                                        </p:attrNameLst>
+                                      </p:cBhvr>
+                                      <p:to>
+                                        <p:strVal val="visible"/>
+                                      </p:to>
+                                    </p:set>
+                                    <p:animEffect transition="in" filter="fade">
+                                      <p:cBhvr>
+                                        <p:cTn id="19" dur="2000"/>
+                                        <p:tgtEl>
+                                          <p:spTgt spid="3">
+                                            <p:txEl>
+                                              <p:pRg st="4" end="4"/>
+                                            </p:txEl>
+                                          </p:spTgt>
+                                        </p:tgtEl>
+                                      </p:cBhvr>
+                                    </p:animEffect>
+                                  </p:childTnLst>
+                                </p:cTn>
+                              </p:par>
+                            </p:childTnLst>
+                          </p:cTn>
+                        </p:par>
+                      </p:childTnLst>
+                    </p:cTn>
+                  </p:par>
+                </p:childTnLst>
+              </p:cTn>
+              <p:prevCondLst>
+                <p:cond evt="onPrev" delay="0">
+                  <p:tgtEl>
+                    <p:sldTgt/>
+                  </p:tgtEl>
+                </p:cond>
+              </p:prevCondLst>
+              <p:nextCondLst>
+                <p:cond evt="onNext" delay="0">
+                  <p:tgtEl>
+                    <p:sldTgt/>
+                  </p:tgtEl>
+                </p:cond>
+              </p:nextCondLst>
+            </p:seq>
+          </p:childTnLst>
+        </p:cTn>
+      </p:par>
+    </p:tnLst>
+    <p:bldLst>
+      <p:bldP spid="3" grpId="0" build="allAtOnce">
+        <p:tmplLst>
+          <p:tmpl lvl="1">
+            <p:tnLst>
+              <p:par>
+                <p:cTn presetID="10" presetClass="entr" presetSubtype="0" fill="hold" nodeType="clickEffect">
+                  <p:stCondLst>
+                    <p:cond delay="0"/>
+                  </p:stCondLst>
+                  <p:childTnLst>
+                    <p:set>
+                      <p:cBhvr>
+                        <p:cTn dur="1" fill="hold">
+                          <p:stCondLst>
+                            <p:cond delay="0"/>
+                          </p:stCondLst>
+                        </p:cTn>
+                        <p:tgtEl>
+                          <p:spTgt spid="3"/>
+                        </p:tgtEl>
+                        <p:attrNameLst>
+                          <p:attrName>style.visibility</p:attrName>
+                        </p:attrNameLst>
+                      </p:cBhvr>
+                      <p:to>
+                        <p:strVal val="visible"/>
+                      </p:to>
+                    </p:set>
+                    <p:animEffect transition="in" filter="fade">
+                      <p:cBhvr>
+                        <p:cTn dur="2000"/>
+                        <p:tgtEl>
+                          <p:spTgt spid="3"/>
+                        </p:tgtEl>
+                      </p:cBhvr>
+                    </p:animEffect>
+                  </p:childTnLst>
+                </p:cTn>
+              </p:par>
+            </p:tnLst>
+          </p:tmpl>
+          <p:tmpl lvl="2">
+            <p:tnLst>
+              <p:par>
+                <p:cTn presetID="10" presetClass="entr" presetSubtype="0" fill="hold" nodeType="withEffect">
+                  <p:stCondLst>
+                    <p:cond delay="0"/>
+                  </p:stCondLst>
+                  <p:childTnLst>
+                    <p:set>
+                      <p:cBhvr>
+                        <p:cTn dur="1" fill="hold">
+                          <p:stCondLst>
+                            <p:cond delay="0"/>
+                          </p:stCondLst>
+                        </p:cTn>
+                        <p:tgtEl>
+                          <p:spTgt spid="3"/>
+                        </p:tgtEl>
+                        <p:attrNameLst>
+                          <p:attrName>style.visibility</p:attrName>
+                        </p:attrNameLst>
+                      </p:cBhvr>
+                      <p:to>
+                        <p:strVal val="visible"/>
+                      </p:to>
+                    </p:set>
+                    <p:animEffect transition="in" filter="fade">
+                      <p:cBhvr>
+                        <p:cTn dur="2000"/>
+                        <p:tgtEl>
+                          <p:spTgt spid="3"/>
+                        </p:tgtEl>
+                      </p:cBhvr>
+                    </p:animEffect>
+                  </p:childTnLst>
+                </p:cTn>
+              </p:par>
+            </p:tnLst>
+          </p:tmpl>
+          <p:tmpl lvl="3">
+            <p:tnLst>
+              <p:par>
+                <p:cTn presetID="10" presetClass="entr" presetSubtype="0" fill="hold" nodeType="withEffect">
+                  <p:stCondLst>
+                    <p:cond delay="0"/>
+                  </p:stCondLst>
+                  <p:childTnLst>
+                    <p:set>
+                      <p:cBhvr>
+                        <p:cTn dur="1" fill="hold">
+                          <p:stCondLst>
+                            <p:cond delay="0"/>
+                          </p:stCondLst>
+                        </p:cTn>
+                        <p:tgtEl>
+                          <p:spTgt spid="3"/>
+                        </p:tgtEl>
+                        <p:attrNameLst>
+                          <p:attrName>style.visibility</p:attrName>
+                        </p:attrNameLst>
+                      </p:cBhvr>
+                      <p:to>
+                        <p:strVal val="visible"/>
+                      </p:to>
+                    </p:set>
+                    <p:animEffect transition="in" filter="fade">
+                      <p:cBhvr>
+                        <p:cTn dur="2000"/>
+                        <p:tgtEl>
+                          <p:spTgt spid="3"/>
+                        </p:tgtEl>
+                      </p:cBhvr>
+                    </p:animEffect>
+                  </p:childTnLst>
+                </p:cTn>
+              </p:par>
+            </p:tnLst>
+          </p:tmpl>
+          <p:tmpl lvl="4">
+            <p:tnLst>
+              <p:par>
+                <p:cTn presetID="10" presetClass="entr" presetSubtype="0" fill="hold" nodeType="withEffect">
+                  <p:stCondLst>
+                    <p:cond delay="0"/>
+                  </p:stCondLst>
+                  <p:childTnLst>
+                    <p:set>
+                      <p:cBhvr>
+                        <p:cTn dur="1" fill="hold">
+                          <p:stCondLst>
+                            <p:cond delay="0"/>
+                          </p:stCondLst>
+                        </p:cTn>
+                        <p:tgtEl>
+                          <p:spTgt spid="3"/>
+                        </p:tgtEl>
+                        <p:attrNameLst>
+                          <p:attrName>style.visibility</p:attrName>
+                        </p:attrNameLst>
+                      </p:cBhvr>
+                      <p:to>
+                        <p:strVal val="visible"/>
+                      </p:to>
+                    </p:set>
+                    <p:animEffect transition="in" filter="fade">
+                      <p:cBhvr>
+                        <p:cTn dur="2000"/>
+                        <p:tgtEl>
+                          <p:spTgt spid="3"/>
+                        </p:tgtEl>
+                      </p:cBhvr>
+                    </p:animEffect>
+                  </p:childTnLst>
+                </p:cTn>
+              </p:par>
+            </p:tnLst>
+          </p:tmpl>
+          <p:tmpl lvl="5">
+            <p:tnLst>
+              <p:par>
+                <p:cTn presetID="10" presetClass="entr" presetSubtype="0" fill="hold" nodeType="withEffect">
+                  <p:stCondLst>
+                    <p:cond delay="0"/>
+                  </p:stCondLst>
+                  <p:childTnLst>
+                    <p:set>
+                      <p:cBhvr>
+                        <p:cTn dur="1" fill="hold">
+                          <p:stCondLst>
+                            <p:cond delay="0"/>
+                          </p:stCondLst>
+                        </p:cTn>
+                        <p:tgtEl>
+                          <p:spTgt spid="3"/>
+                        </p:tgtEl>
+                        <p:attrNameLst>
+                          <p:attrName>style.visibility</p:attrName>
+                        </p:attrNameLst>
+                      </p:cBhvr>
+                      <p:to>
+                        <p:strVal val="visible"/>
+                      </p:to>
+                    </p:set>
+                    <p:animEffect transition="in" filter="fade">
+                      <p:cBhvr>
+                        <p:cTn dur="2000"/>
+                        <p:tgtEl>
+                          <p:spTgt spid="3"/>
+                        </p:tgtEl>
+                      </p:cBhvr>
+                    </p:animEffect>
+                  </p:childTnLst>
+                </p:cTn>
+              </p:par>
+            </p:tnLst>
+          </p:tmpl>
+        </p:tmplLst>
+      </p:bldP>
+    </p:bldLst>
+  </p:timing>
   <p:txStyles>
     <p:titleStyle>
       <a:lvl1pPr algn="ctr" defTabSz="914400" rtl="0" eaLnBrk="1" latinLnBrk="0" hangingPunct="1">
@@ -3647,6 +4123,7 @@
   <p:clrMapOvr>
     <a:masterClrMapping/>
   </p:clrMapOvr>
+  <p:transition/>
   <p:timing>
     <p:tnLst>
       <p:par>
@@ -3717,43 +4194,66 @@
             <a:pPr algn="just"/>
             <a:r>
               <a:rPr lang="en-IN" dirty="0" smtClean="0"/>
-              <a:t>Why ?</a:t>
-            </a:r>
-          </a:p>
-          <a:p>
-            <a:pPr lvl="1" algn="just"/>
+              <a:t>I </a:t>
+            </a:r>
             <a:r>
               <a:rPr lang="en-IN" dirty="0" smtClean="0"/>
-              <a:t>I have programmed with python and C.</a:t>
-            </a:r>
-          </a:p>
-          <a:p>
-            <a:pPr lvl="1" algn="just"/>
+              <a:t>have programmed with python and C.</a:t>
+            </a:r>
+          </a:p>
+          <a:p>
+            <a:pPr algn="just"/>
             <a:r>
               <a:rPr lang="en-IN" dirty="0" smtClean="0"/>
-              <a:t>Is that much important.</a:t>
-            </a:r>
-          </a:p>
-          <a:p>
-            <a:pPr lvl="1" algn="just"/>
+              <a:t>Is </a:t>
+            </a:r>
             <a:r>
               <a:rPr lang="en-IN" dirty="0" smtClean="0"/>
-              <a:t>Is there any languages like this.</a:t>
-            </a:r>
-          </a:p>
-          <a:p>
-            <a:pPr lvl="1" algn="just"/>
+              <a:t>there any languages like this</a:t>
+            </a:r>
             <a:r>
               <a:rPr lang="en-IN" dirty="0" smtClean="0"/>
-              <a:t>Am I need to study all the languages that is created to program the computer.</a:t>
-            </a:r>
-          </a:p>
-          <a:p>
-            <a:pPr lvl="1" algn="just"/>
+              <a:t>. </a:t>
+            </a:r>
+            <a:r>
+              <a:rPr lang="en-US" dirty="0" smtClean="0">
+                <a:hlinkClick r:id="rId2"/>
+              </a:rPr>
+              <a:t>https://en.wikipedia.org/wiki/List_of_programming_languages</a:t>
+            </a:r>
+            <a:endParaRPr lang="en-IN" dirty="0" smtClean="0"/>
+          </a:p>
+          <a:p>
+            <a:pPr algn="just"/>
             <a:r>
               <a:rPr lang="en-IN" dirty="0" smtClean="0"/>
-              <a:t>Then why I need to do this.</a:t>
-            </a:r>
+              <a:t>Am I need to study all the languages that is </a:t>
+            </a:r>
+            <a:r>
+              <a:rPr lang="en-IN" dirty="0" smtClean="0"/>
+              <a:t>created.</a:t>
+            </a:r>
+            <a:endParaRPr lang="en-IN" dirty="0" smtClean="0"/>
+          </a:p>
+          <a:p>
+            <a:pPr algn="just"/>
+            <a:r>
+              <a:rPr lang="en-IN" dirty="0" smtClean="0"/>
+              <a:t>Then why I need to </a:t>
+            </a:r>
+            <a:r>
+              <a:rPr lang="en-IN" dirty="0" smtClean="0"/>
+              <a:t>study java?</a:t>
+            </a:r>
+            <a:endParaRPr lang="en-IN" dirty="0" smtClean="0"/>
+          </a:p>
+          <a:p>
+            <a:pPr algn="just"/>
+            <a:r>
+              <a:rPr lang="en-IN" dirty="0" smtClean="0"/>
+              <a:t>Is that much important ?</a:t>
+            </a:r>
+            <a:endParaRPr lang="en-IN" dirty="0" smtClean="0"/>
           </a:p>
           <a:p>
             <a:pPr lvl="1" algn="just"/>
@@ -3766,6 +4266,7 @@
   <p:clrMapOvr>
     <a:masterClrMapping/>
   </p:clrMapOvr>
+  <p:transition/>
   <p:timing>
     <p:tnLst>
       <p:par>
@@ -3867,7 +4368,6 @@
               <a:rPr lang="en-IN" sz="4000" b="1" i="1" dirty="0" smtClean="0"/>
               <a:t>What is Good &amp; What is Bad</a:t>
             </a:r>
-            <a:endParaRPr lang="en-IN" sz="4000" b="1" i="1" dirty="0" smtClean="0"/>
           </a:p>
         </p:txBody>
       </p:sp>
@@ -3876,6 +4376,14 @@
   <p:clrMapOvr>
     <a:masterClrMapping/>
   </p:clrMapOvr>
+  <p:transition/>
+  <p:timing>
+    <p:tnLst>
+      <p:par>
+        <p:cTn id="1" dur="indefinite" restart="never" nodeType="tmRoot"/>
+      </p:par>
+    </p:tnLst>
+  </p:timing>
 </p:sld>
 </file>
 
@@ -4023,6 +4531,14 @@
   <p:clrMapOvr>
     <a:masterClrMapping/>
   </p:clrMapOvr>
+  <p:transition/>
+  <p:timing>
+    <p:tnLst>
+      <p:par>
+        <p:cTn id="1" dur="indefinite" restart="never" nodeType="tmRoot"/>
+      </p:par>
+    </p:tnLst>
+  </p:timing>
 </p:sld>
 </file>
 
@@ -4097,6 +4613,14 @@
   <p:clrMapOvr>
     <a:masterClrMapping/>
   </p:clrMapOvr>
+  <p:transition/>
+  <p:timing>
+    <p:tnLst>
+      <p:par>
+        <p:cTn id="1" dur="indefinite" restart="never" nodeType="tmRoot"/>
+      </p:par>
+    </p:tnLst>
+  </p:timing>
 </p:sld>
 </file>
 
@@ -4171,6 +4695,14 @@
   <p:clrMapOvr>
     <a:masterClrMapping/>
   </p:clrMapOvr>
+  <p:transition/>
+  <p:timing>
+    <p:tnLst>
+      <p:par>
+        <p:cTn id="1" dur="indefinite" restart="never" nodeType="tmRoot"/>
+      </p:par>
+    </p:tnLst>
+  </p:timing>
 </p:sld>
 </file>
 
@@ -4277,6 +4809,14 @@
   <p:clrMapOvr>
     <a:masterClrMapping/>
   </p:clrMapOvr>
+  <p:transition/>
+  <p:timing>
+    <p:tnLst>
+      <p:par>
+        <p:cTn id="1" dur="indefinite" restart="never" nodeType="tmRoot"/>
+      </p:par>
+    </p:tnLst>
+  </p:timing>
 </p:sld>
 </file>
 
@@ -4646,6 +5186,7 @@
   <p:clrMapOvr>
     <a:masterClrMapping/>
   </p:clrMapOvr>
+  <p:transition/>
   <p:timing>
     <p:tnLst>
       <p:par>

</xml_diff>